<commit_message>
Added local Data to Briefing
Did changes with local data and added it to the briefing.
</commit_message>
<xml_diff>
--- a/Briefings/WinterProgressUpdate.pptx
+++ b/Briefings/WinterProgressUpdate.pptx
@@ -10,6 +10,7 @@
     <p:sldId id="257" r:id="rId4"/>
     <p:sldId id="258" r:id="rId5"/>
     <p:sldId id="260" r:id="rId6"/>
+    <p:sldId id="261" r:id="rId7"/>
   </p:sldIdLst>
   <p:sldSz cx="9144000" cy="6858000" type="screen4x3"/>
   <p:notesSz cx="6858000" cy="9144000"/>
@@ -108,6 +109,22 @@
       </a:defRPr>
     </a:lvl9pPr>
   </p:defaultTextStyle>
+  <p:extLst>
+    <p:ext uri="{EFAFB233-063F-42B5-8137-9DF3F51BA10A}">
+      <p15:sldGuideLst xmlns:p15="http://schemas.microsoft.com/office/powerpoint/2012/main">
+        <p15:guide id="1" orient="horz" pos="2160">
+          <p15:clr>
+            <a:srgbClr val="A4A3A4"/>
+          </p15:clr>
+        </p15:guide>
+        <p15:guide id="2" pos="2880">
+          <p15:clr>
+            <a:srgbClr val="A4A3A4"/>
+          </p15:clr>
+        </p15:guide>
+      </p15:sldGuideLst>
+    </p:ext>
+  </p:extLst>
 </p:presentation>
 </file>
 
@@ -318,7 +335,7 @@
           <a:p>
             <a:fld id="{2FC14BE3-EF99-4F99-922A-30797F6A51B2}" type="datetimeFigureOut">
               <a:rPr lang="en-US" smtClean="0"/>
-              <a:t>12/19/2014</a:t>
+              <a:t>1/6/2015</a:t>
             </a:fld>
             <a:endParaRPr lang="en-US"/>
           </a:p>
@@ -512,7 +529,7 @@
           <a:p>
             <a:fld id="{2FC14BE3-EF99-4F99-922A-30797F6A51B2}" type="datetimeFigureOut">
               <a:rPr lang="en-US" smtClean="0"/>
-              <a:t>12/19/2014</a:t>
+              <a:t>1/6/2015</a:t>
             </a:fld>
             <a:endParaRPr lang="en-US"/>
           </a:p>
@@ -700,7 +717,7 @@
           <a:p>
             <a:fld id="{2FC14BE3-EF99-4F99-922A-30797F6A51B2}" type="datetimeFigureOut">
               <a:rPr lang="en-US" smtClean="0"/>
-              <a:t>12/19/2014</a:t>
+              <a:t>1/6/2015</a:t>
             </a:fld>
             <a:endParaRPr lang="en-US"/>
           </a:p>
@@ -929,7 +946,7 @@
           <a:p>
             <a:fld id="{2FC14BE3-EF99-4F99-922A-30797F6A51B2}" type="datetimeFigureOut">
               <a:rPr lang="en-US" smtClean="0"/>
-              <a:t>12/19/2014</a:t>
+              <a:t>1/6/2015</a:t>
             </a:fld>
             <a:endParaRPr lang="en-US"/>
           </a:p>
@@ -1210,7 +1227,7 @@
           <a:p>
             <a:fld id="{2FC14BE3-EF99-4F99-922A-30797F6A51B2}" type="datetimeFigureOut">
               <a:rPr lang="en-US" smtClean="0"/>
-              <a:t>12/19/2014</a:t>
+              <a:t>1/6/2015</a:t>
             </a:fld>
             <a:endParaRPr lang="en-US"/>
           </a:p>
@@ -1498,7 +1515,7 @@
           <a:p>
             <a:fld id="{2FC14BE3-EF99-4F99-922A-30797F6A51B2}" type="datetimeFigureOut">
               <a:rPr lang="en-US" smtClean="0"/>
-              <a:t>12/19/2014</a:t>
+              <a:t>1/6/2015</a:t>
             </a:fld>
             <a:endParaRPr lang="en-US"/>
           </a:p>
@@ -2052,7 +2069,7 @@
           <a:p>
             <a:fld id="{2FC14BE3-EF99-4F99-922A-30797F6A51B2}" type="datetimeFigureOut">
               <a:rPr lang="en-US" smtClean="0"/>
-              <a:t>12/19/2014</a:t>
+              <a:t>1/6/2015</a:t>
             </a:fld>
             <a:endParaRPr lang="en-US"/>
           </a:p>
@@ -2183,7 +2200,7 @@
           <a:p>
             <a:fld id="{2FC14BE3-EF99-4F99-922A-30797F6A51B2}" type="datetimeFigureOut">
               <a:rPr lang="en-US" smtClean="0"/>
-              <a:t>12/19/2014</a:t>
+              <a:t>1/6/2015</a:t>
             </a:fld>
             <a:endParaRPr lang="en-US"/>
           </a:p>
@@ -2333,7 +2350,7 @@
           <a:p>
             <a:fld id="{2FC14BE3-EF99-4F99-922A-30797F6A51B2}" type="datetimeFigureOut">
               <a:rPr lang="en-US" smtClean="0"/>
-              <a:t>12/19/2014</a:t>
+              <a:t>1/6/2015</a:t>
             </a:fld>
             <a:endParaRPr lang="en-US"/>
           </a:p>
@@ -2654,7 +2671,7 @@
           <a:p>
             <a:fld id="{2FC14BE3-EF99-4F99-922A-30797F6A51B2}" type="datetimeFigureOut">
               <a:rPr lang="en-US" smtClean="0"/>
-              <a:t>12/19/2014</a:t>
+              <a:t>1/6/2015</a:t>
             </a:fld>
             <a:endParaRPr lang="en-US"/>
           </a:p>
@@ -2951,7 +2968,7 @@
           <a:p>
             <a:fld id="{2FC14BE3-EF99-4F99-922A-30797F6A51B2}" type="datetimeFigureOut">
               <a:rPr lang="en-US" smtClean="0"/>
-              <a:t>12/19/2014</a:t>
+              <a:t>1/6/2015</a:t>
             </a:fld>
             <a:endParaRPr lang="en-US"/>
           </a:p>
@@ -3196,7 +3213,7 @@
           <a:p>
             <a:fld id="{2FC14BE3-EF99-4F99-922A-30797F6A51B2}" type="datetimeFigureOut">
               <a:rPr lang="en-US" smtClean="0"/>
-              <a:t>12/19/2014</a:t>
+              <a:t>1/6/2015</a:t>
             </a:fld>
             <a:endParaRPr lang="en-US"/>
           </a:p>
@@ -3736,6 +3753,13 @@
   <p:clrMapOvr>
     <a:masterClrMapping/>
   </p:clrMapOvr>
+  <p:timing>
+    <p:tnLst>
+      <p:par>
+        <p:cTn id="1" dur="indefinite" restart="never" nodeType="tmRoot"/>
+      </p:par>
+    </p:tnLst>
+  </p:timing>
 </p:sld>
 </file>
 
@@ -3808,6 +3832,13 @@
   <p:clrMapOvr>
     <a:masterClrMapping/>
   </p:clrMapOvr>
+  <p:timing>
+    <p:tnLst>
+      <p:par>
+        <p:cTn id="1" dur="indefinite" restart="never" nodeType="tmRoot"/>
+      </p:par>
+    </p:tnLst>
+  </p:timing>
 </p:sld>
 </file>
 
@@ -3887,6 +3918,13 @@
   <p:clrMapOvr>
     <a:masterClrMapping/>
   </p:clrMapOvr>
+  <p:timing>
+    <p:tnLst>
+      <p:par>
+        <p:cTn id="1" dur="indefinite" restart="never" nodeType="tmRoot"/>
+      </p:par>
+    </p:tnLst>
+  </p:timing>
 </p:sld>
 </file>
 
@@ -3961,6 +3999,13 @@
   <p:clrMapOvr>
     <a:masterClrMapping/>
   </p:clrMapOvr>
+  <p:timing>
+    <p:tnLst>
+      <p:par>
+        <p:cTn id="1" dur="indefinite" restart="never" nodeType="tmRoot"/>
+      </p:par>
+    </p:tnLst>
+  </p:timing>
 </p:sld>
 </file>
 
@@ -4035,6 +4080,98 @@
   <p:clrMapOvr>
     <a:masterClrMapping/>
   </p:clrMapOvr>
+  <p:timing>
+    <p:tnLst>
+      <p:par>
+        <p:cTn id="1" dur="indefinite" restart="never" nodeType="tmRoot"/>
+      </p:par>
+    </p:tnLst>
+  </p:timing>
+</p:sld>
+</file>
+
+<file path=ppt/slides/slide6.xml><?xml version="1.0" encoding="utf-8"?>
+<p:sld xmlns:a="http://schemas.openxmlformats.org/drawingml/2006/main" xmlns:r="http://schemas.openxmlformats.org/officeDocument/2006/relationships" xmlns:p="http://schemas.openxmlformats.org/presentationml/2006/main">
+  <p:cSld>
+    <p:spTree>
+      <p:nvGrpSpPr>
+        <p:cNvPr id="1" name=""/>
+        <p:cNvGrpSpPr/>
+        <p:nvPr/>
+      </p:nvGrpSpPr>
+      <p:grpSpPr>
+        <a:xfrm>
+          <a:off x="0" y="0"/>
+          <a:ext cx="0" cy="0"/>
+          <a:chOff x="0" y="0"/>
+          <a:chExt cx="0" cy="0"/>
+        </a:xfrm>
+      </p:grpSpPr>
+      <p:sp>
+        <p:nvSpPr>
+          <p:cNvPr id="2" name="Title 1"/>
+          <p:cNvSpPr>
+            <a:spLocks noGrp="1"/>
+          </p:cNvSpPr>
+          <p:nvPr>
+            <p:ph type="title"/>
+          </p:nvPr>
+        </p:nvSpPr>
+        <p:spPr/>
+        <p:txBody>
+          <a:bodyPr/>
+          <a:lstStyle/>
+          <a:p>
+            <a:endParaRPr lang="en-US"/>
+          </a:p>
+        </p:txBody>
+      </p:sp>
+      <p:pic>
+        <p:nvPicPr>
+          <p:cNvPr id="6" name="Content Placeholder 5"/>
+          <p:cNvPicPr>
+            <a:picLocks noGrp="1" noChangeAspect="1"/>
+          </p:cNvPicPr>
+          <p:nvPr>
+            <p:ph idx="1"/>
+          </p:nvPr>
+        </p:nvPicPr>
+        <p:blipFill>
+          <a:blip r:embed="rId2">
+            <a:extLst>
+              <a:ext uri="{28A0092B-C50C-407E-A947-70E740481C1C}">
+                <a14:useLocalDpi xmlns:a14="http://schemas.microsoft.com/office/drawing/2010/main" val="0"/>
+              </a:ext>
+            </a:extLst>
+          </a:blip>
+          <a:stretch>
+            <a:fillRect/>
+          </a:stretch>
+        </p:blipFill>
+        <p:spPr>
+          <a:xfrm>
+            <a:off x="-4826" y="0"/>
+            <a:ext cx="9148826" cy="6858000"/>
+          </a:xfrm>
+        </p:spPr>
+      </p:pic>
+    </p:spTree>
+    <p:extLst>
+      <p:ext uri="{BB962C8B-B14F-4D97-AF65-F5344CB8AC3E}">
+        <p14:creationId xmlns:p14="http://schemas.microsoft.com/office/powerpoint/2010/main" val="889291988"/>
+      </p:ext>
+    </p:extLst>
+  </p:cSld>
+  <p:clrMapOvr>
+    <a:masterClrMapping/>
+  </p:clrMapOvr>
+  <p:timing>
+    <p:tnLst>
+      <p:par>
+        <p:cTn id="1" dur="indefinite" restart="never" nodeType="tmRoot"/>
+      </p:par>
+    </p:tnLst>
+  </p:timing>
 </p:sld>
 </file>
 

</xml_diff>